<commit_message>
feat: Update projects images and gifs
</commit_message>
<xml_diff>
--- a/src/images/projects/nusforums.pptx
+++ b/src/images/projects/nusforums.pptx
@@ -5,9 +5,9 @@
     <p:sldMasterId id="2147483648" r:id="rId1"/>
   </p:sldMasterIdLst>
   <p:sldIdLst>
-    <p:sldId id="257" r:id="rId2"/>
-    <p:sldId id="260" r:id="rId3"/>
-    <p:sldId id="261" r:id="rId4"/>
+    <p:sldId id="259" r:id="rId2"/>
+    <p:sldId id="257" r:id="rId3"/>
+    <p:sldId id="258" r:id="rId4"/>
   </p:sldIdLst>
   <p:sldSz cx="12192000" cy="6858000"/>
   <p:notesSz cx="6858000" cy="9144000"/>
@@ -106,6 +106,11 @@
       </a:defRPr>
     </a:lvl9pPr>
   </p:defaultTextStyle>
+  <p:extLst>
+    <p:ext uri="{EFAFB233-063F-42B5-8137-9DF3F51BA10A}">
+      <p15:sldGuideLst xmlns:p15="http://schemas.microsoft.com/office/powerpoint/2012/main"/>
+    </p:ext>
+  </p:extLst>
 </p:presentation>
 </file>
 
@@ -3366,13 +3371,13 @@
               </a:ext>
             </a:extLst>
           </a:blip>
-          <a:srcRect t="14444"/>
+          <a:srcRect l="7765" t="23449" r="26061" b="7335"/>
           <a:stretch/>
         </p:blipFill>
         <p:spPr>
           <a:xfrm>
-            <a:off x="71122" y="0"/>
-            <a:ext cx="12010425" cy="6858000"/>
+            <a:off x="4474" y="0"/>
+            <a:ext cx="9823852" cy="6858000"/>
           </a:xfrm>
           <a:prstGeom prst="rect">
             <a:avLst/>
@@ -3381,10 +3386,10 @@
       </p:pic>
       <p:pic>
         <p:nvPicPr>
-          <p:cNvPr id="3" name="Picture 2">
-            <a:extLst>
-              <a:ext uri="{FF2B5EF4-FFF2-40B4-BE49-F238E27FC236}">
-                <a16:creationId xmlns:a16="http://schemas.microsoft.com/office/drawing/2014/main" id="{DA30316F-28B2-1E4E-ADE9-6EE3013DE847}"/>
+          <p:cNvPr id="7" name="Picture 6">
+            <a:extLst>
+              <a:ext uri="{FF2B5EF4-FFF2-40B4-BE49-F238E27FC236}">
+                <a16:creationId xmlns:a16="http://schemas.microsoft.com/office/drawing/2014/main" id="{EC8B50B5-E5E7-B546-81A1-4D6D5B585CA3}"/>
               </a:ext>
             </a:extLst>
           </p:cNvPr>
@@ -3395,13 +3400,43 @@
         </p:nvPicPr>
         <p:blipFill rotWithShape="1">
           <a:blip r:embed="rId3"/>
-          <a:srcRect t="251"/>
+          <a:srcRect b="622"/>
           <a:stretch/>
         </p:blipFill>
         <p:spPr>
           <a:xfrm>
-            <a:off x="2578893" y="1193006"/>
-            <a:ext cx="5373299" cy="3364706"/>
+            <a:off x="1946436" y="609601"/>
+            <a:ext cx="6607629" cy="4178710"/>
+          </a:xfrm>
+          <a:prstGeom prst="rect">
+            <a:avLst/>
+          </a:prstGeom>
+        </p:spPr>
+      </p:pic>
+      <p:pic>
+        <p:nvPicPr>
+          <p:cNvPr id="2" name="Picture 1">
+            <a:extLst>
+              <a:ext uri="{FF2B5EF4-FFF2-40B4-BE49-F238E27FC236}">
+                <a16:creationId xmlns:a16="http://schemas.microsoft.com/office/drawing/2014/main" id="{1F1C0127-BE3D-5243-A98A-EA74D7CE94F6}"/>
+              </a:ext>
+            </a:extLst>
+          </p:cNvPr>
+          <p:cNvPicPr>
+            <a:picLocks noChangeAspect="1"/>
+          </p:cNvPicPr>
+          <p:nvPr/>
+        </p:nvPicPr>
+        <p:blipFill>
+          <a:blip r:embed="rId4"/>
+          <a:stretch>
+            <a:fillRect/>
+          </a:stretch>
+        </p:blipFill>
+        <p:spPr>
+          <a:xfrm>
+            <a:off x="1946435" y="609601"/>
+            <a:ext cx="6578121" cy="4178710"/>
           </a:xfrm>
           <a:prstGeom prst="rect">
             <a:avLst/>
@@ -3411,7 +3446,7 @@
     </p:spTree>
     <p:extLst>
       <p:ext uri="{BB962C8B-B14F-4D97-AF65-F5344CB8AC3E}">
-        <p14:creationId xmlns:p14="http://schemas.microsoft.com/office/powerpoint/2010/main" val="3667067895"/>
+        <p14:creationId xmlns:p14="http://schemas.microsoft.com/office/powerpoint/2010/main" val="1342613842"/>
       </p:ext>
     </p:extLst>
   </p:cSld>
@@ -3460,13 +3495,13 @@
               </a:ext>
             </a:extLst>
           </a:blip>
-          <a:srcRect t="14444"/>
+          <a:srcRect l="7765" t="23449" r="26061" b="7335"/>
           <a:stretch/>
         </p:blipFill>
         <p:spPr>
           <a:xfrm>
-            <a:off x="71122" y="0"/>
-            <a:ext cx="12010425" cy="6858000"/>
+            <a:off x="4474" y="0"/>
+            <a:ext cx="9823852" cy="6858000"/>
           </a:xfrm>
           <a:prstGeom prst="rect">
             <a:avLst/>
@@ -3475,10 +3510,10 @@
       </p:pic>
       <p:pic>
         <p:nvPicPr>
-          <p:cNvPr id="3" name="Picture 2">
-            <a:extLst>
-              <a:ext uri="{FF2B5EF4-FFF2-40B4-BE49-F238E27FC236}">
-                <a16:creationId xmlns:a16="http://schemas.microsoft.com/office/drawing/2014/main" id="{DA30316F-28B2-1E4E-ADE9-6EE3013DE847}"/>
+          <p:cNvPr id="7" name="Picture 6">
+            <a:extLst>
+              <a:ext uri="{FF2B5EF4-FFF2-40B4-BE49-F238E27FC236}">
+                <a16:creationId xmlns:a16="http://schemas.microsoft.com/office/drawing/2014/main" id="{EC8B50B5-E5E7-B546-81A1-4D6D5B585CA3}"/>
               </a:ext>
             </a:extLst>
           </p:cNvPr>
@@ -3487,46 +3522,15 @@
           </p:cNvPicPr>
           <p:nvPr/>
         </p:nvPicPr>
-        <p:blipFill>
+        <p:blipFill rotWithShape="1">
           <a:blip r:embed="rId3"/>
-          <a:stretch>
-            <a:fillRect/>
-          </a:stretch>
+          <a:srcRect b="622"/>
+          <a:stretch/>
         </p:blipFill>
         <p:spPr>
           <a:xfrm>
-            <a:off x="2578893" y="1184529"/>
-            <a:ext cx="5373299" cy="3373183"/>
-          </a:xfrm>
-          <a:prstGeom prst="rect">
-            <a:avLst/>
-          </a:prstGeom>
-        </p:spPr>
-      </p:pic>
-      <p:pic>
-        <p:nvPicPr>
-          <p:cNvPr id="5" name="Picture 4">
-            <a:extLst>
-              <a:ext uri="{FF2B5EF4-FFF2-40B4-BE49-F238E27FC236}">
-                <a16:creationId xmlns:a16="http://schemas.microsoft.com/office/drawing/2014/main" id="{E9977038-65D6-3446-8CFC-F9E7B99669A6}"/>
-              </a:ext>
-            </a:extLst>
-          </p:cNvPr>
-          <p:cNvPicPr>
-            <a:picLocks noChangeAspect="1"/>
-          </p:cNvPicPr>
-          <p:nvPr/>
-        </p:nvPicPr>
-        <p:blipFill>
-          <a:blip r:embed="rId4"/>
-          <a:stretch>
-            <a:fillRect/>
-          </a:stretch>
-        </p:blipFill>
-        <p:spPr>
-          <a:xfrm>
-            <a:off x="2578894" y="1184529"/>
-            <a:ext cx="5365766" cy="3373183"/>
+            <a:off x="1946436" y="609601"/>
+            <a:ext cx="6607629" cy="4178710"/>
           </a:xfrm>
           <a:prstGeom prst="rect">
             <a:avLst/>
@@ -3536,7 +3540,7 @@
     </p:spTree>
     <p:extLst>
       <p:ext uri="{BB962C8B-B14F-4D97-AF65-F5344CB8AC3E}">
-        <p14:creationId xmlns:p14="http://schemas.microsoft.com/office/powerpoint/2010/main" val="510406946"/>
+        <p14:creationId xmlns:p14="http://schemas.microsoft.com/office/powerpoint/2010/main" val="3667067895"/>
       </p:ext>
     </p:extLst>
   </p:cSld>
@@ -3585,13 +3589,13 @@
               </a:ext>
             </a:extLst>
           </a:blip>
-          <a:srcRect t="14444"/>
+          <a:srcRect l="7765" t="23449" r="26061" b="7335"/>
           <a:stretch/>
         </p:blipFill>
         <p:spPr>
           <a:xfrm>
-            <a:off x="71122" y="0"/>
-            <a:ext cx="12010425" cy="6858000"/>
+            <a:off x="4474" y="0"/>
+            <a:ext cx="9823852" cy="6858000"/>
           </a:xfrm>
           <a:prstGeom prst="rect">
             <a:avLst/>
@@ -3600,10 +3604,10 @@
       </p:pic>
       <p:pic>
         <p:nvPicPr>
-          <p:cNvPr id="3" name="Picture 2">
-            <a:extLst>
-              <a:ext uri="{FF2B5EF4-FFF2-40B4-BE49-F238E27FC236}">
-                <a16:creationId xmlns:a16="http://schemas.microsoft.com/office/drawing/2014/main" id="{DA30316F-28B2-1E4E-ADE9-6EE3013DE847}"/>
+          <p:cNvPr id="2" name="Picture 1">
+            <a:extLst>
+              <a:ext uri="{FF2B5EF4-FFF2-40B4-BE49-F238E27FC236}">
+                <a16:creationId xmlns:a16="http://schemas.microsoft.com/office/drawing/2014/main" id="{30C93919-64D2-6F42-94CF-9B29E16CA113}"/>
               </a:ext>
             </a:extLst>
           </p:cNvPr>
@@ -3620,38 +3624,8 @@
         </p:blipFill>
         <p:spPr>
           <a:xfrm>
-            <a:off x="2578893" y="1184529"/>
-            <a:ext cx="5373299" cy="3373183"/>
-          </a:xfrm>
-          <a:prstGeom prst="rect">
-            <a:avLst/>
-          </a:prstGeom>
-        </p:spPr>
-      </p:pic>
-      <p:pic>
-        <p:nvPicPr>
-          <p:cNvPr id="5" name="Picture 4">
-            <a:extLst>
-              <a:ext uri="{FF2B5EF4-FFF2-40B4-BE49-F238E27FC236}">
-                <a16:creationId xmlns:a16="http://schemas.microsoft.com/office/drawing/2014/main" id="{714F627A-7753-0C4C-9976-B94D9FA295E7}"/>
-              </a:ext>
-            </a:extLst>
-          </p:cNvPr>
-          <p:cNvPicPr>
-            <a:picLocks noChangeAspect="1"/>
-          </p:cNvPicPr>
-          <p:nvPr/>
-        </p:nvPicPr>
-        <p:blipFill>
-          <a:blip r:embed="rId4"/>
-          <a:stretch>
-            <a:fillRect/>
-          </a:stretch>
-        </p:blipFill>
-        <p:spPr>
-          <a:xfrm>
-            <a:off x="2578893" y="1184528"/>
-            <a:ext cx="5377898" cy="3373183"/>
+            <a:off x="1952921" y="603116"/>
+            <a:ext cx="6591600" cy="4200460"/>
           </a:xfrm>
           <a:prstGeom prst="rect">
             <a:avLst/>
@@ -3661,7 +3635,7 @@
     </p:spTree>
     <p:extLst>
       <p:ext uri="{BB962C8B-B14F-4D97-AF65-F5344CB8AC3E}">
-        <p14:creationId xmlns:p14="http://schemas.microsoft.com/office/powerpoint/2010/main" val="3132342750"/>
+        <p14:creationId xmlns:p14="http://schemas.microsoft.com/office/powerpoint/2010/main" val="361754865"/>
       </p:ext>
     </p:extLst>
   </p:cSld>

</xml_diff>